<commit_message>
also for pitch presentation
</commit_message>
<xml_diff>
--- a/Myo-Car.pptx
+++ b/Myo-Car.pptx
@@ -9096,27 +9096,11 @@
           <a:p>
             <a:r>
               <a:rPr lang="de-CH" dirty="0"/>
-              <a:t>By </a:t>
+              <a:t>Easy </a:t>
             </a:r>
             <a:r>
               <a:rPr lang="de-CH" dirty="0" err="1"/>
-              <a:t>its</a:t>
-            </a:r>
-            <a:r>
-              <a:rPr lang="de-CH" dirty="0"/>
-              <a:t> modular </a:t>
-            </a:r>
-            <a:r>
-              <a:rPr lang="de-CH" dirty="0" err="1"/>
-              <a:t>architecture</a:t>
-            </a:r>
-            <a:r>
-              <a:rPr lang="de-CH" dirty="0"/>
-              <a:t> and design, </a:t>
-            </a:r>
-            <a:r>
-              <a:rPr lang="de-CH" dirty="0" err="1"/>
-              <a:t>it</a:t>
+              <a:t>to</a:t>
             </a:r>
             <a:r>
               <a:rPr lang="de-CH" dirty="0"/>
@@ -9124,7 +9108,7 @@
             </a:r>
             <a:r>
               <a:rPr lang="de-CH" dirty="0" err="1"/>
-              <a:t>allows</a:t>
+              <a:t>adapt</a:t>
             </a:r>
             <a:r>
               <a:rPr lang="de-CH" dirty="0"/>
@@ -9140,7 +9124,7 @@
             </a:r>
             <a:r>
               <a:rPr lang="de-CH" dirty="0" err="1"/>
-              <a:t>easily</a:t>
+              <a:t>various</a:t>
             </a:r>
             <a:r>
               <a:rPr lang="de-CH" dirty="0"/>
@@ -9148,7 +9132,7 @@
             </a:r>
             <a:r>
               <a:rPr lang="de-CH" dirty="0" err="1"/>
-              <a:t>adapt</a:t>
+              <a:t>driving</a:t>
             </a:r>
             <a:r>
               <a:rPr lang="de-CH" dirty="0"/>
@@ -9156,13 +9140,71 @@
             </a:r>
             <a:r>
               <a:rPr lang="de-CH" dirty="0" err="1"/>
-              <a:t>to</a:t>
+              <a:t>endpoints</a:t>
+            </a:r>
+            <a:r>
+              <a:rPr lang="de-CH" dirty="0"/>
+              <a:t> and </a:t>
+            </a:r>
+            <a:r>
+              <a:rPr lang="de-CH" dirty="0" err="1"/>
+              <a:t>can</a:t>
+            </a:r>
+            <a:r>
+              <a:rPr lang="de-CH" dirty="0"/>
+              <a:t>  </a:t>
+            </a:r>
+            <a:r>
+              <a:rPr lang="de-CH" dirty="0" err="1"/>
+              <a:t>be</a:t>
             </a:r>
             <a:r>
               <a:rPr lang="de-CH" dirty="0"/>
               <a:t> </a:t>
             </a:r>
             <a:r>
+              <a:rPr lang="de-CH" b="1" dirty="0" err="1"/>
+              <a:t>customized</a:t>
+            </a:r>
+            <a:r>
+              <a:rPr lang="de-CH" b="1" dirty="0"/>
+              <a:t> </a:t>
+            </a:r>
+            <a:r>
+              <a:rPr lang="de-CH" b="1" dirty="0" err="1"/>
+              <a:t>to</a:t>
+            </a:r>
+            <a:r>
+              <a:rPr lang="de-CH" b="1" dirty="0"/>
+              <a:t> personal </a:t>
+            </a:r>
+            <a:r>
+              <a:rPr lang="de-CH" b="1" dirty="0" err="1"/>
+              <a:t>needs</a:t>
+            </a:r>
+            <a:r>
+              <a:rPr lang="de-CH" dirty="0"/>
+              <a:t>.</a:t>
+            </a:r>
+          </a:p>
+          <a:p>
+            <a:r>
+              <a:rPr lang="de-CH" dirty="0" err="1"/>
+              <a:t>Suitable</a:t>
+            </a:r>
+            <a:r>
+              <a:rPr lang="de-CH" dirty="0"/>
+              <a:t> </a:t>
+            </a:r>
+            <a:r>
+              <a:rPr lang="de-CH" dirty="0" err="1"/>
+              <a:t>for</a:t>
+            </a:r>
+            <a:r>
+              <a:rPr lang="de-CH" dirty="0"/>
+              <a:t> </a:t>
+            </a:r>
+            <a:r>
               <a:rPr lang="de-CH" dirty="0" err="1"/>
               <a:t>various</a:t>
             </a:r>
@@ -9172,15 +9214,7 @@
             </a:r>
             <a:r>
               <a:rPr lang="de-CH" dirty="0" err="1"/>
-              <a:t>driving</a:t>
-            </a:r>
-            <a:r>
-              <a:rPr lang="de-CH" dirty="0"/>
-              <a:t> (</a:t>
-            </a:r>
-            <a:r>
-              <a:rPr lang="de-CH" dirty="0" err="1"/>
-              <a:t>or</a:t>
+              <a:t>fields</a:t>
             </a:r>
             <a:r>
               <a:rPr lang="de-CH" dirty="0"/>
@@ -9188,65 +9222,43 @@
             </a:r>
             <a:r>
               <a:rPr lang="de-CH" dirty="0" err="1"/>
-              <a:t>other</a:t>
-            </a:r>
-            <a:r>
-              <a:rPr lang="de-CH" dirty="0"/>
-              <a:t>) </a:t>
-            </a:r>
-            <a:r>
-              <a:rPr lang="de-CH" dirty="0" err="1"/>
-              <a:t>endpoints</a:t>
-            </a:r>
-            <a:r>
-              <a:rPr lang="de-CH" dirty="0"/>
-              <a:t> and </a:t>
-            </a:r>
-            <a:r>
-              <a:rPr lang="de-CH" dirty="0" err="1"/>
-              <a:t>can</a:t>
-            </a:r>
-            <a:r>
-              <a:rPr lang="de-CH" dirty="0"/>
-              <a:t>  </a:t>
-            </a:r>
-            <a:r>
-              <a:rPr lang="de-CH" dirty="0" err="1"/>
-              <a:t>be</a:t>
+              <a:t>of</a:t>
             </a:r>
             <a:r>
               <a:rPr lang="de-CH" dirty="0"/>
               <a:t> </a:t>
             </a:r>
             <a:r>
-              <a:rPr lang="de-CH" b="1" dirty="0" err="1"/>
-              <a:t>customized</a:t>
-            </a:r>
-            <a:r>
-              <a:rPr lang="de-CH" b="1" dirty="0"/>
-              <a:t> </a:t>
-            </a:r>
-            <a:r>
-              <a:rPr lang="de-CH" b="1" dirty="0" err="1"/>
-              <a:t>to</a:t>
-            </a:r>
-            <a:r>
-              <a:rPr lang="de-CH" b="1" dirty="0"/>
-              <a:t> personal </a:t>
-            </a:r>
-            <a:r>
-              <a:rPr lang="de-CH" b="1" dirty="0" err="1"/>
-              <a:t>needs</a:t>
-            </a:r>
+              <a:rPr lang="de-CH" dirty="0" err="1"/>
+              <a:t>businesses</a:t>
+            </a:r>
+            <a:endParaRPr lang="de-CH" dirty="0"/>
+          </a:p>
+          <a:p>
+            <a:pPr lvl="1"/>
             <a:r>
               <a:rPr lang="de-CH" dirty="0"/>
-              <a:t>.</a:t>
-            </a:r>
-          </a:p>
-          <a:p>
+              <a:t>e.g. </a:t>
+            </a:r>
             <a:r>
               <a:rPr lang="de-CH" dirty="0" err="1"/>
-              <a:t>Suitable</a:t>
+              <a:t>Healthcare</a:t>
+            </a:r>
+            <a:r>
+              <a:rPr lang="de-CH" dirty="0"/>
+              <a:t>, </a:t>
+            </a:r>
+            <a:r>
+              <a:rPr lang="de-CH" dirty="0" err="1"/>
+              <a:t>defence</a:t>
+            </a:r>
+            <a:r>
+              <a:rPr lang="de-CH" dirty="0"/>
+              <a:t>, </a:t>
+            </a:r>
+            <a:r>
+              <a:rPr lang="de-CH" dirty="0" err="1"/>
+              <a:t>public</a:t>
             </a:r>
             <a:r>
               <a:rPr lang="de-CH" dirty="0"/>
@@ -9254,76 +9266,11 @@
             </a:r>
             <a:r>
               <a:rPr lang="de-CH" dirty="0" err="1"/>
-              <a:t>for</a:t>
-            </a:r>
-            <a:r>
+              <a:t>transportation</a:t>
+            </a:r>
+            <a:br>
               <a:rPr lang="de-CH" dirty="0"/>
-              <a:t> </a:t>
-            </a:r>
-            <a:r>
-              <a:rPr lang="de-CH" dirty="0" err="1"/>
-              <a:t>various</a:t>
-            </a:r>
-            <a:r>
-              <a:rPr lang="de-CH" dirty="0"/>
-              <a:t> </a:t>
-            </a:r>
-            <a:r>
-              <a:rPr lang="de-CH" dirty="0" err="1"/>
-              <a:t>fields</a:t>
-            </a:r>
-            <a:r>
-              <a:rPr lang="de-CH" dirty="0"/>
-              <a:t> </a:t>
-            </a:r>
-            <a:r>
-              <a:rPr lang="de-CH" dirty="0" err="1"/>
-              <a:t>of</a:t>
-            </a:r>
-            <a:r>
-              <a:rPr lang="de-CH" dirty="0"/>
-              <a:t> </a:t>
-            </a:r>
-            <a:r>
-              <a:rPr lang="de-CH" dirty="0" err="1"/>
-              <a:t>businesses</a:t>
-            </a:r>
-            <a:r>
-              <a:rPr lang="de-CH" dirty="0"/>
-              <a:t>, e.g. </a:t>
-            </a:r>
-            <a:r>
-              <a:rPr lang="de-CH" dirty="0" err="1"/>
-              <a:t>Healthcare</a:t>
-            </a:r>
-            <a:r>
-              <a:rPr lang="de-CH" dirty="0"/>
-              <a:t>, </a:t>
-            </a:r>
-            <a:r>
-              <a:rPr lang="de-CH" dirty="0" err="1"/>
-              <a:t>defence</a:t>
-            </a:r>
-            <a:r>
-              <a:rPr lang="de-CH" dirty="0"/>
-              <a:t>, </a:t>
-            </a:r>
-            <a:r>
-              <a:rPr lang="de-CH" dirty="0" err="1"/>
-              <a:t>public</a:t>
-            </a:r>
-            <a:r>
-              <a:rPr lang="de-CH" dirty="0"/>
-              <a:t> </a:t>
-            </a:r>
-            <a:r>
-              <a:rPr lang="de-CH" dirty="0" err="1"/>
-              <a:t>transportation</a:t>
-            </a:r>
-            <a:r>
-              <a:rPr lang="de-CH" dirty="0"/>
-              <a:t> </a:t>
-            </a:r>
+            </a:br>
             <a:r>
               <a:rPr lang="de-CH" dirty="0" err="1"/>
               <a:t>or</a:t>

</xml_diff>